<commit_message>
update guidance section for add'l use cases and updates to MD and MA profiles
</commit_message>
<xml_diff>
--- a/Presentation1.pptx
+++ b/Presentation1.pptx
@@ -3605,7 +3605,7 @@
           <a:p>
             <a:pPr algn="ctr"/>
             <a:r>
-              <a:rPr lang="en-US" smtClean="0"/>
+              <a:rPr lang="en-US" dirty="0" smtClean="0"/>
               <a:t>MedicationStatement</a:t>
             </a:r>
             <a:endParaRPr lang="en-US" dirty="0"/>
@@ -4576,6 +4576,475 @@
           <a:chExt cx="0" cy="0"/>
         </a:xfrm>
       </p:grpSpPr>
+      <p:sp>
+        <p:nvSpPr>
+          <p:cNvPr id="2" name="Rectangle 1"/>
+          <p:cNvSpPr/>
+          <p:nvPr/>
+        </p:nvSpPr>
+        <p:spPr>
+          <a:xfrm>
+            <a:off x="562709" y="844063"/>
+            <a:ext cx="10761784" cy="4009291"/>
+          </a:xfrm>
+          <a:prstGeom prst="rect">
+            <a:avLst/>
+          </a:prstGeom>
+          <a:solidFill>
+            <a:schemeClr val="accent6">
+              <a:lumMod val="20000"/>
+              <a:lumOff val="80000"/>
+            </a:schemeClr>
+          </a:solidFill>
+        </p:spPr>
+        <p:style>
+          <a:lnRef idx="2">
+            <a:schemeClr val="accent1">
+              <a:shade val="50000"/>
+            </a:schemeClr>
+          </a:lnRef>
+          <a:fillRef idx="1">
+            <a:schemeClr val="accent1"/>
+          </a:fillRef>
+          <a:effectRef idx="0">
+            <a:schemeClr val="accent1"/>
+          </a:effectRef>
+          <a:fontRef idx="minor">
+            <a:schemeClr val="lt1"/>
+          </a:fontRef>
+        </p:style>
+        <p:txBody>
+          <a:bodyPr rtlCol="0" anchor="ctr"/>
+          <a:lstStyle/>
+          <a:p>
+            <a:pPr algn="ctr"/>
+            <a:endParaRPr lang="en-US"/>
+          </a:p>
+        </p:txBody>
+      </p:sp>
+      <p:sp>
+        <p:nvSpPr>
+          <p:cNvPr id="3" name="Rounded Rectangle 2"/>
+          <p:cNvSpPr/>
+          <p:nvPr/>
+        </p:nvSpPr>
+        <p:spPr>
+          <a:xfrm>
+            <a:off x="8643715" y="1301857"/>
+            <a:ext cx="2460381" cy="891540"/>
+          </a:xfrm>
+          <a:prstGeom prst="roundRect">
+            <a:avLst/>
+          </a:prstGeom>
+          <a:ln>
+            <a:solidFill>
+              <a:schemeClr val="tx1"/>
+            </a:solidFill>
+          </a:ln>
+        </p:spPr>
+        <p:style>
+          <a:lnRef idx="1">
+            <a:schemeClr val="accent4"/>
+          </a:lnRef>
+          <a:fillRef idx="2">
+            <a:schemeClr val="accent4"/>
+          </a:fillRef>
+          <a:effectRef idx="1">
+            <a:schemeClr val="accent4"/>
+          </a:effectRef>
+          <a:fontRef idx="minor">
+            <a:schemeClr val="dk1"/>
+          </a:fontRef>
+        </p:style>
+        <p:txBody>
+          <a:bodyPr rtlCol="0" anchor="ctr"/>
+          <a:lstStyle/>
+          <a:p>
+            <a:pPr algn="ctr"/>
+            <a:r>
+              <a:rPr lang="en-US" dirty="0" smtClean="0"/>
+              <a:t>Medication[x]</a:t>
+            </a:r>
+            <a:endParaRPr lang="en-US" dirty="0"/>
+          </a:p>
+        </p:txBody>
+      </p:sp>
+      <p:sp>
+        <p:nvSpPr>
+          <p:cNvPr id="4" name="Rounded Rectangle 3"/>
+          <p:cNvSpPr/>
+          <p:nvPr/>
+        </p:nvSpPr>
+        <p:spPr>
+          <a:xfrm>
+            <a:off x="4749309" y="1617785"/>
+            <a:ext cx="2460381" cy="2110154"/>
+          </a:xfrm>
+          <a:prstGeom prst="roundRect">
+            <a:avLst/>
+          </a:prstGeom>
+          <a:ln>
+            <a:solidFill>
+              <a:schemeClr val="tx1"/>
+            </a:solidFill>
+          </a:ln>
+        </p:spPr>
+        <p:style>
+          <a:lnRef idx="1">
+            <a:schemeClr val="accent4"/>
+          </a:lnRef>
+          <a:fillRef idx="2">
+            <a:schemeClr val="accent4"/>
+          </a:fillRef>
+          <a:effectRef idx="1">
+            <a:schemeClr val="accent4"/>
+          </a:effectRef>
+          <a:fontRef idx="minor">
+            <a:schemeClr val="dk1"/>
+          </a:fontRef>
+        </p:style>
+        <p:txBody>
+          <a:bodyPr rtlCol="0" anchor="t"/>
+          <a:lstStyle/>
+          <a:p>
+            <a:pPr algn="ctr"/>
+            <a:r>
+              <a:rPr lang="en-US" dirty="0"/>
+              <a:t>Medication[x]</a:t>
+            </a:r>
+            <a:endParaRPr lang="en-US" dirty="0"/>
+          </a:p>
+        </p:txBody>
+      </p:sp>
+      <p:sp>
+        <p:nvSpPr>
+          <p:cNvPr id="5" name="Rounded Rectangle 4"/>
+          <p:cNvSpPr/>
+          <p:nvPr/>
+        </p:nvSpPr>
+        <p:spPr>
+          <a:xfrm>
+            <a:off x="752331" y="2149151"/>
+            <a:ext cx="2460381" cy="1134883"/>
+          </a:xfrm>
+          <a:prstGeom prst="roundRect">
+            <a:avLst/>
+          </a:prstGeom>
+          <a:ln>
+            <a:solidFill>
+              <a:schemeClr val="tx1"/>
+            </a:solidFill>
+          </a:ln>
+        </p:spPr>
+        <p:style>
+          <a:lnRef idx="1">
+            <a:schemeClr val="accent4"/>
+          </a:lnRef>
+          <a:fillRef idx="2">
+            <a:schemeClr val="accent4"/>
+          </a:fillRef>
+          <a:effectRef idx="1">
+            <a:schemeClr val="accent4"/>
+          </a:effectRef>
+          <a:fontRef idx="minor">
+            <a:schemeClr val="dk1"/>
+          </a:fontRef>
+        </p:style>
+        <p:txBody>
+          <a:bodyPr rtlCol="0" anchor="t"/>
+          <a:lstStyle/>
+          <a:p>
+            <a:pPr algn="ctr"/>
+            <a:r>
+              <a:rPr lang="en-US" dirty="0" smtClean="0"/>
+              <a:t>Medication[x]</a:t>
+            </a:r>
+          </a:p>
+          <a:p>
+            <a:pPr algn="ctr"/>
+            <a:endParaRPr lang="en-US" dirty="0"/>
+          </a:p>
+          <a:p>
+            <a:pPr algn="ctr"/>
+            <a:r>
+              <a:rPr lang="en-US" dirty="0" err="1" smtClean="0"/>
+              <a:t>RxNorm</a:t>
+            </a:r>
+            <a:r>
+              <a:rPr lang="en-US" dirty="0" smtClean="0"/>
+              <a:t> Code</a:t>
+            </a:r>
+            <a:endParaRPr lang="en-US" dirty="0"/>
+          </a:p>
+        </p:txBody>
+      </p:sp>
+      <p:sp>
+        <p:nvSpPr>
+          <p:cNvPr id="6" name="TextBox 5"/>
+          <p:cNvSpPr txBox="1"/>
+          <p:nvPr/>
+        </p:nvSpPr>
+        <p:spPr>
+          <a:xfrm flipH="1">
+            <a:off x="3684122" y="2335048"/>
+            <a:ext cx="564174" cy="584775"/>
+          </a:xfrm>
+          <a:prstGeom prst="rect">
+            <a:avLst/>
+          </a:prstGeom>
+          <a:noFill/>
+        </p:spPr>
+        <p:txBody>
+          <a:bodyPr wrap="square" rtlCol="0" anchor="ctr">
+            <a:spAutoFit/>
+          </a:bodyPr>
+          <a:lstStyle/>
+          <a:p>
+            <a:r>
+              <a:rPr lang="en-US" sz="3200" b="1" dirty="0" smtClean="0"/>
+              <a:t>or</a:t>
+            </a:r>
+            <a:endParaRPr lang="en-US" sz="3200" b="1" dirty="0"/>
+          </a:p>
+        </p:txBody>
+      </p:sp>
+      <p:sp>
+        <p:nvSpPr>
+          <p:cNvPr id="7" name="TextBox 6"/>
+          <p:cNvSpPr txBox="1"/>
+          <p:nvPr/>
+        </p:nvSpPr>
+        <p:spPr>
+          <a:xfrm flipH="1">
+            <a:off x="7647543" y="2335049"/>
+            <a:ext cx="752913" cy="584775"/>
+          </a:xfrm>
+          <a:prstGeom prst="rect">
+            <a:avLst/>
+          </a:prstGeom>
+          <a:noFill/>
+        </p:spPr>
+        <p:txBody>
+          <a:bodyPr wrap="square" rtlCol="0" anchor="ctr">
+            <a:spAutoFit/>
+          </a:bodyPr>
+          <a:lstStyle/>
+          <a:p>
+            <a:r>
+              <a:rPr lang="en-US" sz="3200" b="1" smtClean="0"/>
+              <a:t>or</a:t>
+            </a:r>
+            <a:endParaRPr lang="en-US" sz="3200" b="1" dirty="0"/>
+          </a:p>
+        </p:txBody>
+      </p:sp>
+      <p:sp>
+        <p:nvSpPr>
+          <p:cNvPr id="20" name="Rounded Rectangle 19"/>
+          <p:cNvSpPr/>
+          <p:nvPr/>
+        </p:nvSpPr>
+        <p:spPr>
+          <a:xfrm>
+            <a:off x="8643714" y="2960478"/>
+            <a:ext cx="2460381" cy="891540"/>
+          </a:xfrm>
+          <a:prstGeom prst="roundRect">
+            <a:avLst/>
+          </a:prstGeom>
+          <a:ln>
+            <a:solidFill>
+              <a:schemeClr val="tx1"/>
+            </a:solidFill>
+          </a:ln>
+        </p:spPr>
+        <p:style>
+          <a:lnRef idx="1">
+            <a:schemeClr val="accent4"/>
+          </a:lnRef>
+          <a:fillRef idx="2">
+            <a:schemeClr val="accent4"/>
+          </a:fillRef>
+          <a:effectRef idx="1">
+            <a:schemeClr val="accent4"/>
+          </a:effectRef>
+          <a:fontRef idx="minor">
+            <a:schemeClr val="dk1"/>
+          </a:fontRef>
+        </p:style>
+        <p:txBody>
+          <a:bodyPr rtlCol="0" anchor="ctr"/>
+          <a:lstStyle/>
+          <a:p>
+            <a:pPr algn="ctr"/>
+            <a:r>
+              <a:rPr lang="en-US" smtClean="0"/>
+              <a:t>Medication</a:t>
+            </a:r>
+            <a:endParaRPr lang="en-US" dirty="0"/>
+          </a:p>
+        </p:txBody>
+      </p:sp>
+      <p:cxnSp>
+        <p:nvCxnSpPr>
+          <p:cNvPr id="22" name="Straight Arrow Connector 21"/>
+          <p:cNvCxnSpPr>
+            <a:stCxn id="20" idx="0"/>
+          </p:cNvCxnSpPr>
+          <p:nvPr/>
+        </p:nvCxnSpPr>
+        <p:spPr>
+          <a:xfrm flipH="1" flipV="1">
+            <a:off x="9873904" y="2165263"/>
+            <a:ext cx="1" cy="795215"/>
+          </a:xfrm>
+          <a:prstGeom prst="straightConnector1">
+            <a:avLst/>
+          </a:prstGeom>
+          <a:ln w="38100">
+            <a:solidFill>
+              <a:schemeClr val="tx1"/>
+            </a:solidFill>
+            <a:tailEnd type="triangle" w="lg" len="lg"/>
+          </a:ln>
+        </p:spPr>
+        <p:style>
+          <a:lnRef idx="1">
+            <a:schemeClr val="accent1"/>
+          </a:lnRef>
+          <a:fillRef idx="0">
+            <a:schemeClr val="accent1"/>
+          </a:fillRef>
+          <a:effectRef idx="0">
+            <a:schemeClr val="accent1"/>
+          </a:effectRef>
+          <a:fontRef idx="minor">
+            <a:schemeClr val="tx1"/>
+          </a:fontRef>
+        </p:style>
+      </p:cxnSp>
+      <p:sp>
+        <p:nvSpPr>
+          <p:cNvPr id="25" name="TextBox 24"/>
+          <p:cNvSpPr txBox="1"/>
+          <p:nvPr/>
+        </p:nvSpPr>
+        <p:spPr>
+          <a:xfrm>
+            <a:off x="829993" y="4417254"/>
+            <a:ext cx="10274101" cy="369332"/>
+          </a:xfrm>
+          <a:prstGeom prst="rect">
+            <a:avLst/>
+          </a:prstGeom>
+          <a:noFill/>
+        </p:spPr>
+        <p:txBody>
+          <a:bodyPr wrap="square" rtlCol="0">
+            <a:spAutoFit/>
+          </a:bodyPr>
+          <a:lstStyle/>
+          <a:p>
+            <a:r>
+              <a:rPr lang="en-US" dirty="0" smtClean="0"/>
+              <a:t>Medication[x] = MedicationAdministration, MedicationDispense, MedicationRequest</a:t>
+            </a:r>
+            <a:r>
+              <a:rPr lang="en-US" smtClean="0"/>
+              <a:t>, MedicationStatement</a:t>
+            </a:r>
+            <a:endParaRPr lang="en-US"/>
+          </a:p>
+        </p:txBody>
+      </p:sp>
+      <p:sp>
+        <p:nvSpPr>
+          <p:cNvPr id="26" name="Rounded Rectangle 25"/>
+          <p:cNvSpPr/>
+          <p:nvPr/>
+        </p:nvSpPr>
+        <p:spPr>
+          <a:xfrm>
+            <a:off x="4867419" y="2588454"/>
+            <a:ext cx="2243794" cy="821201"/>
+          </a:xfrm>
+          <a:prstGeom prst="roundRect">
+            <a:avLst/>
+          </a:prstGeom>
+          <a:ln>
+            <a:solidFill>
+              <a:schemeClr val="tx1"/>
+            </a:solidFill>
+            <a:prstDash val="dash"/>
+          </a:ln>
+        </p:spPr>
+        <p:style>
+          <a:lnRef idx="1">
+            <a:schemeClr val="accent4"/>
+          </a:lnRef>
+          <a:fillRef idx="2">
+            <a:schemeClr val="accent4"/>
+          </a:fillRef>
+          <a:effectRef idx="1">
+            <a:schemeClr val="accent4"/>
+          </a:effectRef>
+          <a:fontRef idx="minor">
+            <a:schemeClr val="dk1"/>
+          </a:fontRef>
+        </p:style>
+        <p:txBody>
+          <a:bodyPr rtlCol="0" anchor="ctr"/>
+          <a:lstStyle/>
+          <a:p>
+            <a:pPr algn="ctr"/>
+            <a:r>
+              <a:rPr lang="en-US" dirty="0"/>
+              <a:t>c</a:t>
+            </a:r>
+            <a:r>
+              <a:rPr lang="en-US" dirty="0" smtClean="0"/>
+              <a:t>ontained Medication</a:t>
+            </a:r>
+            <a:endParaRPr lang="en-US" dirty="0"/>
+          </a:p>
+        </p:txBody>
+      </p:sp>
+      <p:cxnSp>
+        <p:nvCxnSpPr>
+          <p:cNvPr id="29" name="Straight Arrow Connector 28"/>
+          <p:cNvCxnSpPr/>
+          <p:nvPr/>
+        </p:nvCxnSpPr>
+        <p:spPr>
+          <a:xfrm flipH="1" flipV="1">
+            <a:off x="5949097" y="2060729"/>
+            <a:ext cx="19484" cy="548638"/>
+          </a:xfrm>
+          <a:prstGeom prst="straightConnector1">
+            <a:avLst/>
+          </a:prstGeom>
+          <a:ln w="38100">
+            <a:solidFill>
+              <a:schemeClr val="tx1"/>
+            </a:solidFill>
+            <a:tailEnd type="triangle" w="lg" len="lg"/>
+          </a:ln>
+        </p:spPr>
+        <p:style>
+          <a:lnRef idx="1">
+            <a:schemeClr val="accent1"/>
+          </a:lnRef>
+          <a:fillRef idx="0">
+            <a:schemeClr val="accent1"/>
+          </a:fillRef>
+          <a:effectRef idx="0">
+            <a:schemeClr val="accent1"/>
+          </a:effectRef>
+          <a:fontRef idx="minor">
+            <a:schemeClr val="tx1"/>
+          </a:fontRef>
+        </p:style>
+      </p:cxnSp>
     </p:spTree>
     <p:extLst>
       <p:ext uri="{BB962C8B-B14F-4D97-AF65-F5344CB8AC3E}">

</xml_diff>